<commit_message>
Add class slide and example
</commit_message>
<xml_diff>
--- a/Class presentation/Week5 - Edward/11-05-2014.pptx
+++ b/Class presentation/Week5 - Edward/11-05-2014.pptx
@@ -21,6 +21,7 @@
     <p:sldId id="266" r:id="rId18"/>
     <p:sldId id="267" r:id="rId19"/>
     <p:sldId id="268" r:id="rId20"/>
+    <p:sldId id="269" r:id="rId21"/>
   </p:sldIdLst>
   <p:sldSz cx="9144000" cy="6858000"/>
   <p:notesSz cx="6858000" cy="9144000"/>
@@ -1757,7 +1758,7 @@
             </a:pPr>
             <a:r>
               <a:rPr sz="3600"/>
-              <a:t>Summary</a:t>
+              <a:t>Simply through</a:t>
             </a:r>
           </a:p>
         </p:txBody>
@@ -1771,7 +1772,7 @@
         <p:spPr>
           <a:xfrm>
             <a:off x="457200" y="1905000"/>
-            <a:ext cx="8242300" cy="2032001"/>
+            <a:ext cx="8242300" cy="4043681"/>
           </a:xfrm>
           <a:prstGeom prst="rect">
             <a:avLst/>
@@ -1800,7 +1801,15 @@
               <a:defRPr sz="1800"/>
             </a:pPr>
             <a:r>
-              <a:t>Instantiated (from storyboard - many ways for this to happen which we’ll cover later) awakeFromNib, viewDidLoad</a:t>
+              <a:rPr>
+                <a:solidFill>
+                  <a:srgbClr val="D77A00"/>
+                </a:solidFill>
+              </a:rPr>
+              <a:t>ViewDidLoad</a:t>
+            </a:r>
+            <a:r>
+              <a:t> - Called when you create the class and load from xib. Great for initial setup and one-time-only work. </a:t>
             </a:r>
           </a:p>
           <a:p>
@@ -1813,7 +1822,15 @@
               <a:defRPr sz="1800"/>
             </a:pPr>
             <a:r>
-              <a:t>(when geometry changes) viewWillLayoutSubviews: and viewDidLayoutSubviews:</a:t>
+              <a:rPr>
+                <a:solidFill>
+                  <a:srgbClr val="D77A00"/>
+                </a:solidFill>
+              </a:rPr>
+              <a:t>ViewWillAppear</a:t>
+            </a:r>
+            <a:r>
+              <a:t> - Called right before your view appears, good for hiding/showing fields or any operations that you want to happen every time before the view is visible. Because you might be going back and forth between views, this will be called every time your view is about to appear on the screen. </a:t>
             </a:r>
           </a:p>
           <a:p>
@@ -1826,7 +1843,57 @@
               <a:defRPr sz="1800"/>
             </a:pPr>
             <a:r>
-              <a:t>(next group can happen repeatedly as your MVC appears and disappears from the screen …) viewWillAppear: and viewDidAppear:</a:t>
+              <a:rPr>
+                <a:solidFill>
+                  <a:srgbClr val="D77A00"/>
+                </a:solidFill>
+              </a:rPr>
+              <a:t>ViewDidAppear</a:t>
+            </a:r>
+            <a:r>
+              <a:t> - Called after the view appears - great place to start an animations or the loading of external data from an API. </a:t>
+            </a:r>
+          </a:p>
+          <a:p>
+            <a:pPr lvl="0" marL="180473" indent="-180473" algn="l" defTabSz="457200">
+              <a:lnSpc>
+                <a:spcPct val="120000"/>
+              </a:lnSpc>
+              <a:buSzPct val="100000"/>
+              <a:buChar char="•"/>
+              <a:defRPr sz="1800"/>
+            </a:pPr>
+            <a:r>
+              <a:rPr>
+                <a:solidFill>
+                  <a:srgbClr val="D77A00"/>
+                </a:solidFill>
+              </a:rPr>
+              <a:t>ViewWill/DidDisappear</a:t>
+            </a:r>
+            <a:r>
+              <a:t> - Same idea as WillAppear. </a:t>
+            </a:r>
+          </a:p>
+          <a:p>
+            <a:pPr lvl="0" marL="180473" indent="-180473" algn="l" defTabSz="457200">
+              <a:lnSpc>
+                <a:spcPct val="120000"/>
+              </a:lnSpc>
+              <a:buSzPct val="100000"/>
+              <a:buChar char="•"/>
+              <a:defRPr sz="1800"/>
+            </a:pPr>
+            <a:r>
+              <a:rPr>
+                <a:solidFill>
+                  <a:srgbClr val="D77A00"/>
+                </a:solidFill>
+              </a:rPr>
+              <a:t>ViewDidUnload/ViewDidDispose</a:t>
+            </a:r>
+            <a:r>
+              <a:t> - In Objective C, this is where you do your clean-up and release of stuff, but this is handled automatically so not much you really need to do here. </a:t>
             </a:r>
           </a:p>
         </p:txBody>
@@ -1888,9 +1955,250 @@
           <a:chExt cx="0" cy="0"/>
         </a:xfrm>
       </p:grpSpPr>
+      <p:pic>
+        <p:nvPicPr>
+          <p:cNvPr id="81" name="image.jpeg"/>
+          <p:cNvPicPr/>
+          <p:nvPr/>
+        </p:nvPicPr>
+        <p:blipFill>
+          <a:blip r:embed="rId2">
+            <a:extLst/>
+          </a:blip>
+          <a:stretch>
+            <a:fillRect/>
+          </a:stretch>
+        </p:blipFill>
+        <p:spPr>
+          <a:xfrm>
+            <a:off x="3886200" y="6327775"/>
+            <a:ext cx="1371600" cy="530225"/>
+          </a:xfrm>
+          <a:prstGeom prst="rect">
+            <a:avLst/>
+          </a:prstGeom>
+          <a:ln w="12700">
+            <a:miter lim="400000"/>
+          </a:ln>
+        </p:spPr>
+      </p:pic>
       <p:sp>
         <p:nvSpPr>
-          <p:cNvPr id="81" name="Shape 81"/>
+          <p:cNvPr id="82" name="Shape 82"/>
+          <p:cNvSpPr/>
+          <p:nvPr/>
+        </p:nvSpPr>
+        <p:spPr>
+          <a:xfrm>
+            <a:off x="455612" y="1417637"/>
+            <a:ext cx="8229601" cy="1"/>
+          </a:xfrm>
+          <a:prstGeom prst="line">
+            <a:avLst/>
+          </a:prstGeom>
+          <a:ln w="31750">
+            <a:solidFill>
+              <a:srgbClr val="E46C0A"/>
+            </a:solidFill>
+            <a:round/>
+          </a:ln>
+          <a:effectLst>
+            <a:outerShdw sx="100000" sy="100000" kx="0" ky="0" algn="b" rotWithShape="0" blurRad="38100" dist="19999" dir="5400000">
+              <a:srgbClr val="000000">
+                <a:alpha val="37998"/>
+              </a:srgbClr>
+            </a:outerShdw>
+          </a:effectLst>
+        </p:spPr>
+        <p:txBody>
+          <a:bodyPr lIns="0" tIns="0" rIns="0" bIns="0"/>
+          <a:lstStyle/>
+          <a:p>
+            <a:pPr lvl="0" algn="l" defTabSz="457200">
+              <a:defRPr sz="1200"/>
+            </a:pPr>
+          </a:p>
+        </p:txBody>
+      </p:sp>
+      <p:sp>
+        <p:nvSpPr>
+          <p:cNvPr id="83" name="Shape 83"/>
+          <p:cNvSpPr/>
+          <p:nvPr>
+            <p:ph type="title" idx="4294967295"/>
+          </p:nvPr>
+        </p:nvSpPr>
+        <p:spPr>
+          <a:xfrm>
+            <a:off x="457200" y="92075"/>
+            <a:ext cx="8229600" cy="1506538"/>
+          </a:xfrm>
+          <a:prstGeom prst="rect">
+            <a:avLst/>
+          </a:prstGeom>
+          <a:ln w="12700">
+            <a:miter lim="400000"/>
+          </a:ln>
+          <a:extLst>
+            <a:ext uri="{C572A759-6A51-4108-AA02-DFA0A04FC94B}">
+              <ma14:wrappingTextBoxFlag xmlns:ma14="http://schemas.microsoft.com/office/mac/drawingml/2011/main" val="1"/>
+            </a:ext>
+          </a:extLst>
+        </p:spPr>
+        <p:txBody>
+          <a:bodyPr lIns="0" tIns="0" rIns="0" bIns="0" anchor="ctr">
+            <a:normAutofit fontScale="100000" lnSpcReduction="0"/>
+          </a:bodyPr>
+          <a:lstStyle>
+            <a:lvl1pPr algn="ctr">
+              <a:defRPr sz="3600">
+                <a:latin typeface="Adobe 黑体 Std R"/>
+                <a:ea typeface="Adobe 黑体 Std R"/>
+                <a:cs typeface="Adobe 黑体 Std R"/>
+                <a:sym typeface="Adobe 黑体 Std R"/>
+              </a:defRPr>
+            </a:lvl1pPr>
+          </a:lstStyle>
+          <a:p>
+            <a:pPr lvl="0">
+              <a:defRPr sz="1800"/>
+            </a:pPr>
+            <a:r>
+              <a:rPr sz="3600"/>
+              <a:t>Summary</a:t>
+            </a:r>
+          </a:p>
+        </p:txBody>
+      </p:sp>
+      <p:sp>
+        <p:nvSpPr>
+          <p:cNvPr id="84" name="Shape 84"/>
+          <p:cNvSpPr/>
+          <p:nvPr/>
+        </p:nvSpPr>
+        <p:spPr>
+          <a:xfrm>
+            <a:off x="457200" y="1905000"/>
+            <a:ext cx="8242300" cy="2032001"/>
+          </a:xfrm>
+          <a:prstGeom prst="rect">
+            <a:avLst/>
+          </a:prstGeom>
+          <a:ln w="12700">
+            <a:miter lim="400000"/>
+          </a:ln>
+          <a:extLst>
+            <a:ext uri="{C572A759-6A51-4108-AA02-DFA0A04FC94B}">
+              <ma14:wrappingTextBoxFlag xmlns:ma14="http://schemas.microsoft.com/office/mac/drawingml/2011/main" val="1"/>
+            </a:ext>
+          </a:extLst>
+        </p:spPr>
+        <p:txBody>
+          <a:bodyPr lIns="38100" tIns="38100" rIns="38100" bIns="38100">
+            <a:spAutoFit/>
+          </a:bodyPr>
+          <a:lstStyle/>
+          <a:p>
+            <a:pPr lvl="0" marL="180473" indent="-180473" algn="l" defTabSz="457200">
+              <a:lnSpc>
+                <a:spcPct val="120000"/>
+              </a:lnSpc>
+              <a:buSzPct val="100000"/>
+              <a:buChar char="•"/>
+              <a:defRPr sz="1800"/>
+            </a:pPr>
+            <a:r>
+              <a:t>Instantiated (from storyboard - many ways for this to happen which we’ll cover later) awakeFromNib, viewDidLoad</a:t>
+            </a:r>
+          </a:p>
+          <a:p>
+            <a:pPr lvl="0" marL="180473" indent="-180473" algn="l" defTabSz="457200">
+              <a:lnSpc>
+                <a:spcPct val="120000"/>
+              </a:lnSpc>
+              <a:buSzPct val="100000"/>
+              <a:buChar char="•"/>
+              <a:defRPr sz="1800"/>
+            </a:pPr>
+            <a:r>
+              <a:t>(when geometry changes) viewWillLayoutSubviews: and viewDidLayoutSubviews:</a:t>
+            </a:r>
+          </a:p>
+          <a:p>
+            <a:pPr lvl="0" marL="180473" indent="-180473" algn="l" defTabSz="457200">
+              <a:lnSpc>
+                <a:spcPct val="120000"/>
+              </a:lnSpc>
+              <a:buSzPct val="100000"/>
+              <a:buChar char="•"/>
+              <a:defRPr sz="1800"/>
+            </a:pPr>
+            <a:r>
+              <a:t>(next group can happen repeatedly as your MVC appears and disappears from the screen …) viewWillAppear: and viewDidAppear:</a:t>
+            </a:r>
+          </a:p>
+        </p:txBody>
+      </p:sp>
+      <p:sp>
+        <p:nvSpPr>
+          <p:cNvPr id="85" name="Shape 85"/>
+          <p:cNvSpPr/>
+          <p:nvPr>
+            <p:ph type="sldNum" sz="quarter" idx="2"/>
+          </p:nvPr>
+        </p:nvSpPr>
+        <p:spPr>
+          <a:prstGeom prst="rect">
+            <a:avLst/>
+          </a:prstGeom>
+          <a:extLst>
+            <a:ext uri="{C572A759-6A51-4108-AA02-DFA0A04FC94B}">
+              <ma14:wrappingTextBoxFlag xmlns:ma14="http://schemas.microsoft.com/office/mac/drawingml/2011/main" val="1"/>
+            </a:ext>
+          </a:extLst>
+        </p:spPr>
+        <p:txBody>
+          <a:bodyPr lIns="0" tIns="0" rIns="0" bIns="0"/>
+          <a:lstStyle/>
+          <a:p>
+            <a:pPr lvl="0">
+              <a:defRPr sz="1800"/>
+            </a:pPr>
+            <a:fld id="{86CB4B4D-7CA3-9044-876B-883B54F8677D}" type="slidenum">
+              <a:rPr sz="1200"/>
+            </a:fld>
+          </a:p>
+        </p:txBody>
+      </p:sp>
+    </p:spTree>
+  </p:cSld>
+  <p:clrMapOvr>
+    <a:masterClrMapping/>
+  </p:clrMapOvr>
+  <p:transition spd="med" advClick="1"/>
+</p:sld>
+</file>
+
+<file path=ppt/slides/slide14.xml><?xml version="1.0" encoding="utf-8"?>
+<p:sld xmlns:a="http://schemas.openxmlformats.org/drawingml/2006/main" xmlns:r="http://schemas.openxmlformats.org/officeDocument/2006/relationships" xmlns:p="http://schemas.openxmlformats.org/presentationml/2006/main" showMasterSp="1" showMasterPhAnim="1">
+  <p:cSld>
+    <p:spTree>
+      <p:nvGrpSpPr>
+        <p:cNvPr id="1" name=""/>
+        <p:cNvGrpSpPr/>
+        <p:nvPr/>
+      </p:nvGrpSpPr>
+      <p:grpSpPr>
+        <a:xfrm>
+          <a:off x="0" y="0"/>
+          <a:ext cx="0" cy="0"/>
+          <a:chOff x="0" y="0"/>
+          <a:chExt cx="0" cy="0"/>
+        </a:xfrm>
+      </p:grpSpPr>
+      <p:sp>
+        <p:nvSpPr>
+          <p:cNvPr id="87" name="Shape 87"/>
           <p:cNvSpPr/>
           <p:nvPr/>
         </p:nvSpPr>
@@ -1983,7 +2291,7 @@
       </p:sp>
       <p:sp>
         <p:nvSpPr>
-          <p:cNvPr id="82" name="Shape 82"/>
+          <p:cNvPr id="88" name="Shape 88"/>
           <p:cNvSpPr/>
           <p:nvPr>
             <p:ph type="sldNum" sz="quarter" idx="2"/>

</xml_diff>